<commit_message>
feat #135: Add PptFileService to open and extract textBox
</commit_message>
<xml_diff>
--- a/ppt-translator/TestFiles/sample.pptx
+++ b/ppt-translator/TestFiles/sample.pptx
@@ -263,7 +263,7 @@
           <a:p>
             <a:fld id="{B0D4AF20-4DC5-924B-A9CE-445A38BC4BE6}" type="datetimeFigureOut">
               <a:rPr kumimoji="1" lang="ko-KR" altLang="en-US" smtClean="0"/>
-              <a:t>2025. 11. 1.</a:t>
+              <a:t>2025. 11. 4.</a:t>
             </a:fld>
             <a:endParaRPr kumimoji="1" lang="ko-KR" altLang="en-US"/>
           </a:p>
@@ -461,7 +461,7 @@
           <a:p>
             <a:fld id="{B0D4AF20-4DC5-924B-A9CE-445A38BC4BE6}" type="datetimeFigureOut">
               <a:rPr kumimoji="1" lang="ko-KR" altLang="en-US" smtClean="0"/>
-              <a:t>2025. 11. 1.</a:t>
+              <a:t>2025. 11. 4.</a:t>
             </a:fld>
             <a:endParaRPr kumimoji="1" lang="ko-KR" altLang="en-US"/>
           </a:p>
@@ -669,7 +669,7 @@
           <a:p>
             <a:fld id="{B0D4AF20-4DC5-924B-A9CE-445A38BC4BE6}" type="datetimeFigureOut">
               <a:rPr kumimoji="1" lang="ko-KR" altLang="en-US" smtClean="0"/>
-              <a:t>2025. 11. 1.</a:t>
+              <a:t>2025. 11. 4.</a:t>
             </a:fld>
             <a:endParaRPr kumimoji="1" lang="ko-KR" altLang="en-US"/>
           </a:p>
@@ -867,7 +867,7 @@
           <a:p>
             <a:fld id="{B0D4AF20-4DC5-924B-A9CE-445A38BC4BE6}" type="datetimeFigureOut">
               <a:rPr kumimoji="1" lang="ko-KR" altLang="en-US" smtClean="0"/>
-              <a:t>2025. 11. 1.</a:t>
+              <a:t>2025. 11. 4.</a:t>
             </a:fld>
             <a:endParaRPr kumimoji="1" lang="ko-KR" altLang="en-US"/>
           </a:p>
@@ -1142,7 +1142,7 @@
           <a:p>
             <a:fld id="{B0D4AF20-4DC5-924B-A9CE-445A38BC4BE6}" type="datetimeFigureOut">
               <a:rPr kumimoji="1" lang="ko-KR" altLang="en-US" smtClean="0"/>
-              <a:t>2025. 11. 1.</a:t>
+              <a:t>2025. 11. 4.</a:t>
             </a:fld>
             <a:endParaRPr kumimoji="1" lang="ko-KR" altLang="en-US"/>
           </a:p>
@@ -1407,7 +1407,7 @@
           <a:p>
             <a:fld id="{B0D4AF20-4DC5-924B-A9CE-445A38BC4BE6}" type="datetimeFigureOut">
               <a:rPr kumimoji="1" lang="ko-KR" altLang="en-US" smtClean="0"/>
-              <a:t>2025. 11. 1.</a:t>
+              <a:t>2025. 11. 4.</a:t>
             </a:fld>
             <a:endParaRPr kumimoji="1" lang="ko-KR" altLang="en-US"/>
           </a:p>
@@ -1819,7 +1819,7 @@
           <a:p>
             <a:fld id="{B0D4AF20-4DC5-924B-A9CE-445A38BC4BE6}" type="datetimeFigureOut">
               <a:rPr kumimoji="1" lang="ko-KR" altLang="en-US" smtClean="0"/>
-              <a:t>2025. 11. 1.</a:t>
+              <a:t>2025. 11. 4.</a:t>
             </a:fld>
             <a:endParaRPr kumimoji="1" lang="ko-KR" altLang="en-US"/>
           </a:p>
@@ -1960,7 +1960,7 @@
           <a:p>
             <a:fld id="{B0D4AF20-4DC5-924B-A9CE-445A38BC4BE6}" type="datetimeFigureOut">
               <a:rPr kumimoji="1" lang="ko-KR" altLang="en-US" smtClean="0"/>
-              <a:t>2025. 11. 1.</a:t>
+              <a:t>2025. 11. 4.</a:t>
             </a:fld>
             <a:endParaRPr kumimoji="1" lang="ko-KR" altLang="en-US"/>
           </a:p>
@@ -2073,7 +2073,7 @@
           <a:p>
             <a:fld id="{B0D4AF20-4DC5-924B-A9CE-445A38BC4BE6}" type="datetimeFigureOut">
               <a:rPr kumimoji="1" lang="ko-KR" altLang="en-US" smtClean="0"/>
-              <a:t>2025. 11. 1.</a:t>
+              <a:t>2025. 11. 4.</a:t>
             </a:fld>
             <a:endParaRPr kumimoji="1" lang="ko-KR" altLang="en-US"/>
           </a:p>
@@ -2384,7 +2384,7 @@
           <a:p>
             <a:fld id="{B0D4AF20-4DC5-924B-A9CE-445A38BC4BE6}" type="datetimeFigureOut">
               <a:rPr kumimoji="1" lang="ko-KR" altLang="en-US" smtClean="0"/>
-              <a:t>2025. 11. 1.</a:t>
+              <a:t>2025. 11. 4.</a:t>
             </a:fld>
             <a:endParaRPr kumimoji="1" lang="ko-KR" altLang="en-US"/>
           </a:p>
@@ -2672,7 +2672,7 @@
           <a:p>
             <a:fld id="{B0D4AF20-4DC5-924B-A9CE-445A38BC4BE6}" type="datetimeFigureOut">
               <a:rPr kumimoji="1" lang="ko-KR" altLang="en-US" smtClean="0"/>
-              <a:t>2025. 11. 1.</a:t>
+              <a:t>2025. 11. 4.</a:t>
             </a:fld>
             <a:endParaRPr kumimoji="1" lang="ko-KR" altLang="en-US"/>
           </a:p>
@@ -2913,7 +2913,7 @@
           <a:p>
             <a:fld id="{B0D4AF20-4DC5-924B-A9CE-445A38BC4BE6}" type="datetimeFigureOut">
               <a:rPr kumimoji="1" lang="ko-KR" altLang="en-US" smtClean="0"/>
-              <a:t>2025. 11. 1.</a:t>
+              <a:t>2025. 11. 4.</a:t>
             </a:fld>
             <a:endParaRPr kumimoji="1" lang="ko-KR" altLang="en-US"/>
           </a:p>
@@ -3353,9 +3353,79 @@
           <a:p>
             <a:r>
               <a:rPr kumimoji="1" lang="en-US" altLang="ko-KR" dirty="0"/>
-              <a:t>1</a:t>
+              <a:t>lorem1</a:t>
             </a:r>
             <a:endParaRPr kumimoji="1" lang="ko-KR" altLang="en-US" dirty="0"/>
+          </a:p>
+        </p:txBody>
+      </p:sp>
+      <p:sp>
+        <p:nvSpPr>
+          <p:cNvPr id="3" name="TextBox 2">
+            <a:extLst>
+              <a:ext uri="{FF2B5EF4-FFF2-40B4-BE49-F238E27FC236}">
+                <a16:creationId xmlns:a16="http://schemas.microsoft.com/office/drawing/2014/main" id="{B1F5A8E4-C698-5FA3-AC7A-A858BC4D643C}"/>
+              </a:ext>
+            </a:extLst>
+          </p:cNvPr>
+          <p:cNvSpPr txBox="1"/>
+          <p:nvPr/>
+        </p:nvSpPr>
+        <p:spPr>
+          <a:xfrm>
+            <a:off x="4851400" y="2413000"/>
+            <a:ext cx="184731" cy="369332"/>
+          </a:xfrm>
+          <a:prstGeom prst="rect">
+            <a:avLst/>
+          </a:prstGeom>
+          <a:noFill/>
+        </p:spPr>
+        <p:txBody>
+          <a:bodyPr wrap="none" rtlCol="0">
+            <a:spAutoFit/>
+          </a:bodyPr>
+          <a:lstStyle/>
+          <a:p>
+            <a:endParaRPr kumimoji="1" lang="ko-KR" altLang="en-US" dirty="0"/>
+          </a:p>
+        </p:txBody>
+      </p:sp>
+      <p:sp>
+        <p:nvSpPr>
+          <p:cNvPr id="4" name="TextBox 3">
+            <a:extLst>
+              <a:ext uri="{FF2B5EF4-FFF2-40B4-BE49-F238E27FC236}">
+                <a16:creationId xmlns:a16="http://schemas.microsoft.com/office/drawing/2014/main" id="{5BF0B6F4-63D3-3A32-5D52-78385B09AF6F}"/>
+              </a:ext>
+            </a:extLst>
+          </p:cNvPr>
+          <p:cNvSpPr txBox="1"/>
+          <p:nvPr/>
+        </p:nvSpPr>
+        <p:spPr>
+          <a:xfrm>
+            <a:off x="4876800" y="4508500"/>
+            <a:ext cx="965264" cy="646331"/>
+          </a:xfrm>
+          <a:prstGeom prst="rect">
+            <a:avLst/>
+          </a:prstGeom>
+          <a:noFill/>
+        </p:spPr>
+        <p:txBody>
+          <a:bodyPr wrap="none" rtlCol="0">
+            <a:spAutoFit/>
+          </a:bodyPr>
+          <a:lstStyle/>
+          <a:p>
+            <a:r>
+              <a:rPr kumimoji="1" lang="en-US" altLang="ko-KR"/>
+              <a:t>Lorem2</a:t>
+            </a:r>
+          </a:p>
+          <a:p>
+            <a:endParaRPr kumimoji="1" lang="ko-KR" altLang="en-US"/>
           </a:p>
         </p:txBody>
       </p:sp>
@@ -3417,9 +3487,12 @@
           <a:lstStyle/>
           <a:p>
             <a:r>
-              <a:rPr kumimoji="1" lang="en-US" altLang="ko-KR" dirty="0"/>
-              <a:t>2</a:t>
-            </a:r>
+              <a:rPr lang="en" altLang="ko-KR" dirty="0"/>
+              <a:t>Ipsum</a:t>
+            </a:r>
+            <a:br>
+              <a:rPr lang="en" altLang="ko-KR" dirty="0"/>
+            </a:br>
             <a:endParaRPr kumimoji="1" lang="ko-KR" altLang="en-US" dirty="0"/>
           </a:p>
         </p:txBody>
@@ -3478,12 +3551,14 @@
         </p:nvSpPr>
         <p:spPr/>
         <p:txBody>
-          <a:bodyPr/>
-          <a:lstStyle/>
-          <a:p>
-            <a:r>
-              <a:rPr kumimoji="1" lang="en-US" altLang="ko-KR" dirty="0"/>
-              <a:t>3</a:t>
+          <a:bodyPr>
+            <a:normAutofit/>
+          </a:bodyPr>
+          <a:lstStyle/>
+          <a:p>
+            <a:r>
+              <a:rPr lang="en" altLang="ko-KR" dirty="0"/>
+              <a:t>simply dummy</a:t>
             </a:r>
             <a:endParaRPr kumimoji="1" lang="ko-KR" altLang="en-US" dirty="0"/>
           </a:p>
@@ -3543,12 +3618,14 @@
         </p:nvSpPr>
         <p:spPr/>
         <p:txBody>
-          <a:bodyPr/>
-          <a:lstStyle/>
-          <a:p>
-            <a:r>
-              <a:rPr kumimoji="1" lang="en-US" altLang="ko-KR" dirty="0"/>
-              <a:t>4</a:t>
+          <a:bodyPr>
+            <a:normAutofit/>
+          </a:bodyPr>
+          <a:lstStyle/>
+          <a:p>
+            <a:r>
+              <a:rPr lang="en" altLang="ko-KR" dirty="0"/>
+              <a:t>text of the printing</a:t>
             </a:r>
             <a:endParaRPr kumimoji="1" lang="ko-KR" altLang="en-US" dirty="0"/>
           </a:p>
@@ -3612,8 +3689,8 @@
           <a:lstStyle/>
           <a:p>
             <a:r>
-              <a:rPr kumimoji="1" lang="en-US" altLang="ko-KR"/>
-              <a:t>5</a:t>
+              <a:rPr lang="en" altLang="ko-KR" dirty="0"/>
+              <a:t>and typesetting</a:t>
             </a:r>
             <a:endParaRPr kumimoji="1" lang="ko-KR" altLang="en-US" dirty="0"/>
           </a:p>

</xml_diff>